<commit_message>
update: FirstDayCommand sequence diagram
</commit_message>
<xml_diff>
--- a/docs/diagrams/FirstDaySequenceDiagram.pptx
+++ b/docs/diagrams/FirstDaySequenceDiagram.pptx
@@ -208,7 +208,7 @@
           <a:p>
             <a:fld id="{F5CC4B3F-88C1-4FFA-B1B6-F41C21DC6924}" type="datetimeFigureOut">
               <a:rPr lang="en-US" smtClean="0"/>
-              <a:t>10/27/2018</a:t>
+              <a:t>11/6/2018</a:t>
             </a:fld>
             <a:endParaRPr lang="en-US"/>
           </a:p>
@@ -738,7 +738,7 @@
           <a:p>
             <a:fld id="{78C97017-6FC3-485B-9764-EAC9E56C1D49}" type="datetimeFigureOut">
               <a:rPr lang="en-US" smtClean="0"/>
-              <a:t>10/27/2018</a:t>
+              <a:t>11/6/2018</a:t>
             </a:fld>
             <a:endParaRPr lang="en-US"/>
           </a:p>
@@ -906,7 +906,7 @@
           <a:p>
             <a:fld id="{78C97017-6FC3-485B-9764-EAC9E56C1D49}" type="datetimeFigureOut">
               <a:rPr lang="en-US" smtClean="0"/>
-              <a:t>10/27/2018</a:t>
+              <a:t>11/6/2018</a:t>
             </a:fld>
             <a:endParaRPr lang="en-US"/>
           </a:p>
@@ -1084,7 +1084,7 @@
           <a:p>
             <a:fld id="{78C97017-6FC3-485B-9764-EAC9E56C1D49}" type="datetimeFigureOut">
               <a:rPr lang="en-US" smtClean="0"/>
-              <a:t>10/27/2018</a:t>
+              <a:t>11/6/2018</a:t>
             </a:fld>
             <a:endParaRPr lang="en-US"/>
           </a:p>
@@ -1252,7 +1252,7 @@
           <a:p>
             <a:fld id="{78C97017-6FC3-485B-9764-EAC9E56C1D49}" type="datetimeFigureOut">
               <a:rPr lang="en-US" smtClean="0"/>
-              <a:t>10/27/2018</a:t>
+              <a:t>11/6/2018</a:t>
             </a:fld>
             <a:endParaRPr lang="en-US"/>
           </a:p>
@@ -1497,7 +1497,7 @@
           <a:p>
             <a:fld id="{78C97017-6FC3-485B-9764-EAC9E56C1D49}" type="datetimeFigureOut">
               <a:rPr lang="en-US" smtClean="0"/>
-              <a:t>10/27/2018</a:t>
+              <a:t>11/6/2018</a:t>
             </a:fld>
             <a:endParaRPr lang="en-US"/>
           </a:p>
@@ -1782,7 +1782,7 @@
           <a:p>
             <a:fld id="{78C97017-6FC3-485B-9764-EAC9E56C1D49}" type="datetimeFigureOut">
               <a:rPr lang="en-US" smtClean="0"/>
-              <a:t>10/27/2018</a:t>
+              <a:t>11/6/2018</a:t>
             </a:fld>
             <a:endParaRPr lang="en-US"/>
           </a:p>
@@ -2201,7 +2201,7 @@
           <a:p>
             <a:fld id="{78C97017-6FC3-485B-9764-EAC9E56C1D49}" type="datetimeFigureOut">
               <a:rPr lang="en-US" smtClean="0"/>
-              <a:t>10/27/2018</a:t>
+              <a:t>11/6/2018</a:t>
             </a:fld>
             <a:endParaRPr lang="en-US"/>
           </a:p>
@@ -2318,7 +2318,7 @@
           <a:p>
             <a:fld id="{78C97017-6FC3-485B-9764-EAC9E56C1D49}" type="datetimeFigureOut">
               <a:rPr lang="en-US" smtClean="0"/>
-              <a:t>10/27/2018</a:t>
+              <a:t>11/6/2018</a:t>
             </a:fld>
             <a:endParaRPr lang="en-US"/>
           </a:p>
@@ -2413,7 +2413,7 @@
           <a:p>
             <a:fld id="{78C97017-6FC3-485B-9764-EAC9E56C1D49}" type="datetimeFigureOut">
               <a:rPr lang="en-US" smtClean="0"/>
-              <a:t>10/27/2018</a:t>
+              <a:t>11/6/2018</a:t>
             </a:fld>
             <a:endParaRPr lang="en-US"/>
           </a:p>
@@ -2688,7 +2688,7 @@
           <a:p>
             <a:fld id="{78C97017-6FC3-485B-9764-EAC9E56C1D49}" type="datetimeFigureOut">
               <a:rPr lang="en-US" smtClean="0"/>
-              <a:t>10/27/2018</a:t>
+              <a:t>11/6/2018</a:t>
             </a:fld>
             <a:endParaRPr lang="en-US"/>
           </a:p>
@@ -2940,7 +2940,7 @@
           <a:p>
             <a:fld id="{78C97017-6FC3-485B-9764-EAC9E56C1D49}" type="datetimeFigureOut">
               <a:rPr lang="en-US" smtClean="0"/>
-              <a:t>10/27/2018</a:t>
+              <a:t>11/6/2018</a:t>
             </a:fld>
             <a:endParaRPr lang="en-US"/>
           </a:p>
@@ -3151,7 +3151,7 @@
           <a:p>
             <a:fld id="{78C97017-6FC3-485B-9764-EAC9E56C1D49}" type="datetimeFigureOut">
               <a:rPr lang="en-US" smtClean="0"/>
-              <a:t>10/27/2018</a:t>
+              <a:t>11/6/2018</a:t>
             </a:fld>
             <a:endParaRPr lang="en-US"/>
           </a:p>
@@ -4590,8 +4590,8 @@
         </p:nvSpPr>
         <p:spPr>
           <a:xfrm>
-            <a:off x="8382000" y="4424381"/>
-            <a:ext cx="152400" cy="199803"/>
+            <a:off x="8382000" y="4424382"/>
+            <a:ext cx="152400" cy="147618"/>
           </a:xfrm>
           <a:prstGeom prst="rect">
             <a:avLst/>
@@ -6616,7 +6616,7 @@
         <p:spPr>
           <a:xfrm>
             <a:off x="5442189" y="3929499"/>
-            <a:ext cx="105975" cy="559835"/>
+            <a:ext cx="120050" cy="694685"/>
           </a:xfrm>
           <a:prstGeom prst="rect">
             <a:avLst/>
@@ -6712,6 +6712,55 @@
           </a:p>
         </p:txBody>
       </p:sp>
+      <p:cxnSp>
+        <p:nvCxnSpPr>
+          <p:cNvPr id="60" name="Straight Arrow Connector 59">
+            <a:extLst>
+              <a:ext uri="{FF2B5EF4-FFF2-40B4-BE49-F238E27FC236}">
+                <a16:creationId xmlns:a16="http://schemas.microsoft.com/office/drawing/2014/main" id="{F471103F-25A8-4490-AD9C-253A07F0923C}"/>
+              </a:ext>
+            </a:extLst>
+          </p:cNvPr>
+          <p:cNvCxnSpPr>
+            <a:cxnSpLocks/>
+          </p:cNvCxnSpPr>
+          <p:nvPr/>
+        </p:nvCxnSpPr>
+        <p:spPr>
+          <a:xfrm flipV="1">
+            <a:off x="5562239" y="4555117"/>
+            <a:ext cx="2835319" cy="8640"/>
+          </a:xfrm>
+          <a:prstGeom prst="straightConnector1">
+            <a:avLst/>
+          </a:prstGeom>
+          <a:ln w="19050">
+            <a:solidFill>
+              <a:schemeClr val="accent4">
+                <a:lumMod val="60000"/>
+                <a:lumOff val="40000"/>
+              </a:schemeClr>
+            </a:solidFill>
+            <a:prstDash val="sysDash"/>
+            <a:headEnd type="arrow" w="med" len="med"/>
+            <a:tailEnd type="none" w="med" len="med"/>
+          </a:ln>
+        </p:spPr>
+        <p:style>
+          <a:lnRef idx="1">
+            <a:schemeClr val="accent1"/>
+          </a:lnRef>
+          <a:fillRef idx="0">
+            <a:schemeClr val="accent1"/>
+          </a:fillRef>
+          <a:effectRef idx="0">
+            <a:schemeClr val="accent1"/>
+          </a:effectRef>
+          <a:fontRef idx="minor">
+            <a:schemeClr val="tx1"/>
+          </a:fontRef>
+        </p:style>
+      </p:cxnSp>
     </p:spTree>
     <p:extLst>
       <p:ext uri="{BB962C8B-B14F-4D97-AF65-F5344CB8AC3E}">

</xml_diff>

<commit_message>
fix: sequence diagram for FirstDayCommand
</commit_message>
<xml_diff>
--- a/docs/diagrams/FirstDaySequenceDiagram.pptx
+++ b/docs/diagrams/FirstDaySequenceDiagram.pptx
@@ -208,7 +208,7 @@
           <a:p>
             <a:fld id="{F5CC4B3F-88C1-4FFA-B1B6-F41C21DC6924}" type="datetimeFigureOut">
               <a:rPr lang="en-US" smtClean="0"/>
-              <a:t>11/6/2018</a:t>
+              <a:t>11/9/2018</a:t>
             </a:fld>
             <a:endParaRPr lang="en-US"/>
           </a:p>
@@ -738,7 +738,7 @@
           <a:p>
             <a:fld id="{78C97017-6FC3-485B-9764-EAC9E56C1D49}" type="datetimeFigureOut">
               <a:rPr lang="en-US" smtClean="0"/>
-              <a:t>11/6/2018</a:t>
+              <a:t>11/9/2018</a:t>
             </a:fld>
             <a:endParaRPr lang="en-US"/>
           </a:p>
@@ -906,7 +906,7 @@
           <a:p>
             <a:fld id="{78C97017-6FC3-485B-9764-EAC9E56C1D49}" type="datetimeFigureOut">
               <a:rPr lang="en-US" smtClean="0"/>
-              <a:t>11/6/2018</a:t>
+              <a:t>11/9/2018</a:t>
             </a:fld>
             <a:endParaRPr lang="en-US"/>
           </a:p>
@@ -1084,7 +1084,7 @@
           <a:p>
             <a:fld id="{78C97017-6FC3-485B-9764-EAC9E56C1D49}" type="datetimeFigureOut">
               <a:rPr lang="en-US" smtClean="0"/>
-              <a:t>11/6/2018</a:t>
+              <a:t>11/9/2018</a:t>
             </a:fld>
             <a:endParaRPr lang="en-US"/>
           </a:p>
@@ -1252,7 +1252,7 @@
           <a:p>
             <a:fld id="{78C97017-6FC3-485B-9764-EAC9E56C1D49}" type="datetimeFigureOut">
               <a:rPr lang="en-US" smtClean="0"/>
-              <a:t>11/6/2018</a:t>
+              <a:t>11/9/2018</a:t>
             </a:fld>
             <a:endParaRPr lang="en-US"/>
           </a:p>
@@ -1497,7 +1497,7 @@
           <a:p>
             <a:fld id="{78C97017-6FC3-485B-9764-EAC9E56C1D49}" type="datetimeFigureOut">
               <a:rPr lang="en-US" smtClean="0"/>
-              <a:t>11/6/2018</a:t>
+              <a:t>11/9/2018</a:t>
             </a:fld>
             <a:endParaRPr lang="en-US"/>
           </a:p>
@@ -1782,7 +1782,7 @@
           <a:p>
             <a:fld id="{78C97017-6FC3-485B-9764-EAC9E56C1D49}" type="datetimeFigureOut">
               <a:rPr lang="en-US" smtClean="0"/>
-              <a:t>11/6/2018</a:t>
+              <a:t>11/9/2018</a:t>
             </a:fld>
             <a:endParaRPr lang="en-US"/>
           </a:p>
@@ -2201,7 +2201,7 @@
           <a:p>
             <a:fld id="{78C97017-6FC3-485B-9764-EAC9E56C1D49}" type="datetimeFigureOut">
               <a:rPr lang="en-US" smtClean="0"/>
-              <a:t>11/6/2018</a:t>
+              <a:t>11/9/2018</a:t>
             </a:fld>
             <a:endParaRPr lang="en-US"/>
           </a:p>
@@ -2318,7 +2318,7 @@
           <a:p>
             <a:fld id="{78C97017-6FC3-485B-9764-EAC9E56C1D49}" type="datetimeFigureOut">
               <a:rPr lang="en-US" smtClean="0"/>
-              <a:t>11/6/2018</a:t>
+              <a:t>11/9/2018</a:t>
             </a:fld>
             <a:endParaRPr lang="en-US"/>
           </a:p>
@@ -2413,7 +2413,7 @@
           <a:p>
             <a:fld id="{78C97017-6FC3-485B-9764-EAC9E56C1D49}" type="datetimeFigureOut">
               <a:rPr lang="en-US" smtClean="0"/>
-              <a:t>11/6/2018</a:t>
+              <a:t>11/9/2018</a:t>
             </a:fld>
             <a:endParaRPr lang="en-US"/>
           </a:p>
@@ -2688,7 +2688,7 @@
           <a:p>
             <a:fld id="{78C97017-6FC3-485B-9764-EAC9E56C1D49}" type="datetimeFigureOut">
               <a:rPr lang="en-US" smtClean="0"/>
-              <a:t>11/6/2018</a:t>
+              <a:t>11/9/2018</a:t>
             </a:fld>
             <a:endParaRPr lang="en-US"/>
           </a:p>
@@ -2940,7 +2940,7 @@
           <a:p>
             <a:fld id="{78C97017-6FC3-485B-9764-EAC9E56C1D49}" type="datetimeFigureOut">
               <a:rPr lang="en-US" smtClean="0"/>
-              <a:t>11/6/2018</a:t>
+              <a:t>11/9/2018</a:t>
             </a:fld>
             <a:endParaRPr lang="en-US"/>
           </a:p>
@@ -3151,7 +3151,7 @@
           <a:p>
             <a:fld id="{78C97017-6FC3-485B-9764-EAC9E56C1D49}" type="datetimeFigureOut">
               <a:rPr lang="en-US" smtClean="0"/>
-              <a:t>11/6/2018</a:t>
+              <a:t>11/9/2018</a:t>
             </a:fld>
             <a:endParaRPr lang="en-US"/>
           </a:p>
@@ -4106,7 +4106,7 @@
         </p:nvCxnSpPr>
         <p:spPr>
           <a:xfrm flipV="1">
-            <a:off x="274806" y="1587551"/>
+            <a:off x="312426" y="1604515"/>
             <a:ext cx="1596514" cy="1"/>
           </a:xfrm>
           <a:prstGeom prst="straightConnector1">
@@ -5616,7 +5616,7 @@
         </p:nvSpPr>
         <p:spPr>
           <a:xfrm>
-            <a:off x="3874491" y="1905387"/>
+            <a:off x="3874491" y="1893666"/>
             <a:ext cx="217532" cy="45719"/>
           </a:xfrm>
           <a:custGeom>
@@ -5843,7 +5843,7 @@
         </p:nvSpPr>
         <p:spPr>
           <a:xfrm>
-            <a:off x="4100207" y="1848550"/>
+            <a:off x="4092023" y="1830228"/>
             <a:ext cx="1880841" cy="169277"/>
           </a:xfrm>
           <a:prstGeom prst="rect">
@@ -5893,7 +5893,7 @@
         </p:nvSpPr>
         <p:spPr>
           <a:xfrm>
-            <a:off x="4124910" y="2004196"/>
+            <a:off x="3799526" y="2014600"/>
             <a:ext cx="1583410" cy="169277"/>
           </a:xfrm>
           <a:prstGeom prst="rect">
@@ -5920,7 +5920,7 @@
           <a:p>
             <a:r>
               <a:rPr lang="en-US" sz="1100" dirty="0" err="1"/>
-              <a:t>Date.isValidDate</a:t>
+              <a:t>isValidDate</a:t>
             </a:r>
             <a:r>
               <a:rPr lang="en-US" sz="1100" dirty="0"/>
@@ -5943,7 +5943,7 @@
         </p:nvSpPr>
         <p:spPr>
           <a:xfrm>
-            <a:off x="4071725" y="2170256"/>
+            <a:off x="4034507" y="2280535"/>
             <a:ext cx="1262666" cy="169277"/>
           </a:xfrm>
           <a:prstGeom prst="rect">
@@ -5981,10 +5981,10 @@
       </p:sp>
       <p:sp>
         <p:nvSpPr>
-          <p:cNvPr id="91" name="Freeform: Shape 90">
+          <p:cNvPr id="92" name="Freeform: Shape 91">
             <a:extLst>
               <a:ext uri="{FF2B5EF4-FFF2-40B4-BE49-F238E27FC236}">
-                <a16:creationId xmlns:a16="http://schemas.microsoft.com/office/drawing/2014/main" id="{AFEC23EA-806B-4FB1-A12F-4B036F5E716A}"/>
+                <a16:creationId xmlns:a16="http://schemas.microsoft.com/office/drawing/2014/main" id="{9C395CE3-0A28-42D6-860C-D0146F518056}"/>
               </a:ext>
             </a:extLst>
           </p:cNvPr>
@@ -5993,7 +5993,7 @@
         </p:nvSpPr>
         <p:spPr>
           <a:xfrm>
-            <a:off x="3884228" y="2057400"/>
+            <a:off x="3855027" y="2343347"/>
             <a:ext cx="217532" cy="45719"/>
           </a:xfrm>
           <a:custGeom>
@@ -6099,10 +6099,10 @@
       </p:sp>
       <p:sp>
         <p:nvSpPr>
-          <p:cNvPr id="92" name="Freeform: Shape 91">
+          <p:cNvPr id="94" name="Freeform: Shape 93">
             <a:extLst>
               <a:ext uri="{FF2B5EF4-FFF2-40B4-BE49-F238E27FC236}">
-                <a16:creationId xmlns:a16="http://schemas.microsoft.com/office/drawing/2014/main" id="{9C395CE3-0A28-42D6-860C-D0146F518056}"/>
+                <a16:creationId xmlns:a16="http://schemas.microsoft.com/office/drawing/2014/main" id="{F0958432-13B2-4EBC-8B23-8833DA387AAE}"/>
               </a:ext>
             </a:extLst>
           </p:cNvPr>
@@ -6111,7 +6111,7 @@
         </p:nvSpPr>
         <p:spPr>
           <a:xfrm>
-            <a:off x="3882027" y="2232922"/>
+            <a:off x="5514429" y="3585485"/>
             <a:ext cx="217532" cy="45719"/>
           </a:xfrm>
           <a:custGeom>
@@ -6217,10 +6217,60 @@
       </p:sp>
       <p:sp>
         <p:nvSpPr>
-          <p:cNvPr id="94" name="Freeform: Shape 93">
+          <p:cNvPr id="96" name="TextBox 95">
             <a:extLst>
               <a:ext uri="{FF2B5EF4-FFF2-40B4-BE49-F238E27FC236}">
-                <a16:creationId xmlns:a16="http://schemas.microsoft.com/office/drawing/2014/main" id="{F0958432-13B2-4EBC-8B23-8833DA387AAE}"/>
+                <a16:creationId xmlns:a16="http://schemas.microsoft.com/office/drawing/2014/main" id="{E1F61F72-1C6C-4417-BC98-266E3B315FC7}"/>
+              </a:ext>
+            </a:extLst>
+          </p:cNvPr>
+          <p:cNvSpPr txBox="1"/>
+          <p:nvPr/>
+        </p:nvSpPr>
+        <p:spPr>
+          <a:xfrm>
+            <a:off x="5721851" y="3499977"/>
+            <a:ext cx="2058089" cy="169277"/>
+          </a:xfrm>
+          <a:prstGeom prst="rect">
+            <a:avLst/>
+          </a:prstGeom>
+          <a:noFill/>
+        </p:spPr>
+        <p:txBody>
+          <a:bodyPr wrap="square" lIns="0" tIns="0" rIns="0" bIns="0" rtlCol="0">
+            <a:spAutoFit/>
+          </a:bodyPr>
+          <a:lstStyle>
+            <a:defPPr>
+              <a:defRPr lang="en-US"/>
+            </a:defPPr>
+            <a:lvl1pPr algn="r">
+              <a:defRPr sz="1400">
+                <a:solidFill>
+                  <a:srgbClr val="0070C0"/>
+                </a:solidFill>
+              </a:defRPr>
+            </a:lvl1pPr>
+          </a:lstStyle>
+          <a:p>
+            <a:r>
+              <a:rPr lang="en-US" sz="1100" dirty="0" err="1"/>
+              <a:t>computeRangeOfWeeks</a:t>
+            </a:r>
+            <a:r>
+              <a:rPr lang="en-US" sz="1100" dirty="0"/>
+              <a:t>(“130818”)</a:t>
+            </a:r>
+          </a:p>
+        </p:txBody>
+      </p:sp>
+      <p:sp>
+        <p:nvSpPr>
+          <p:cNvPr id="97" name="Rectangle 96">
+            <a:extLst>
+              <a:ext uri="{FF2B5EF4-FFF2-40B4-BE49-F238E27FC236}">
+                <a16:creationId xmlns:a16="http://schemas.microsoft.com/office/drawing/2014/main" id="{E6D861D5-2BA5-4625-9B4B-76E6B38EB67F}"/>
               </a:ext>
             </a:extLst>
           </p:cNvPr>
@@ -6229,7 +6279,107 @@
         </p:nvSpPr>
         <p:spPr>
           <a:xfrm>
-            <a:off x="5528400" y="3577181"/>
+            <a:off x="5448310" y="3615422"/>
+            <a:ext cx="105975" cy="107664"/>
+          </a:xfrm>
+          <a:prstGeom prst="rect">
+            <a:avLst/>
+          </a:prstGeom>
+          <a:solidFill>
+            <a:srgbClr val="0070C0"/>
+          </a:solidFill>
+          <a:ln>
+            <a:solidFill>
+              <a:schemeClr val="tx1"/>
+            </a:solidFill>
+          </a:ln>
+          <a:effectLst/>
+        </p:spPr>
+        <p:style>
+          <a:lnRef idx="1">
+            <a:schemeClr val="accent3"/>
+          </a:lnRef>
+          <a:fillRef idx="2">
+            <a:schemeClr val="accent3"/>
+          </a:fillRef>
+          <a:effectRef idx="1">
+            <a:schemeClr val="accent3"/>
+          </a:effectRef>
+          <a:fontRef idx="minor">
+            <a:schemeClr val="dk1"/>
+          </a:fontRef>
+        </p:style>
+        <p:txBody>
+          <a:bodyPr rtlCol="0" anchor="ctr"/>
+          <a:lstStyle/>
+          <a:p>
+            <a:pPr algn="ctr"/>
+            <a:endParaRPr lang="en-SG" sz="1400"/>
+          </a:p>
+        </p:txBody>
+      </p:sp>
+      <p:sp>
+        <p:nvSpPr>
+          <p:cNvPr id="98" name="TextBox 97">
+            <a:extLst>
+              <a:ext uri="{FF2B5EF4-FFF2-40B4-BE49-F238E27FC236}">
+                <a16:creationId xmlns:a16="http://schemas.microsoft.com/office/drawing/2014/main" id="{FA081E4E-6F91-4E65-A922-6996D924E23C}"/>
+              </a:ext>
+            </a:extLst>
+          </p:cNvPr>
+          <p:cNvSpPr txBox="1"/>
+          <p:nvPr/>
+        </p:nvSpPr>
+        <p:spPr>
+          <a:xfrm>
+            <a:off x="5697842" y="3650132"/>
+            <a:ext cx="807664" cy="169277"/>
+          </a:xfrm>
+          <a:prstGeom prst="rect">
+            <a:avLst/>
+          </a:prstGeom>
+          <a:noFill/>
+        </p:spPr>
+        <p:txBody>
+          <a:bodyPr wrap="square" lIns="0" tIns="0" rIns="0" bIns="0" rtlCol="0">
+            <a:spAutoFit/>
+          </a:bodyPr>
+          <a:lstStyle>
+            <a:defPPr>
+              <a:defRPr lang="en-US"/>
+            </a:defPPr>
+            <a:lvl1pPr algn="r">
+              <a:defRPr sz="1400">
+                <a:solidFill>
+                  <a:srgbClr val="0070C0"/>
+                </a:solidFill>
+              </a:defRPr>
+            </a:lvl1pPr>
+          </a:lstStyle>
+          <a:p>
+            <a:r>
+              <a:rPr lang="en-US" sz="1100" dirty="0" err="1"/>
+              <a:t>rangeOfWeek</a:t>
+            </a:r>
+            <a:endParaRPr lang="en-US" sz="1100" dirty="0"/>
+          </a:p>
+        </p:txBody>
+      </p:sp>
+      <p:sp>
+        <p:nvSpPr>
+          <p:cNvPr id="101" name="Freeform: Shape 100">
+            <a:extLst>
+              <a:ext uri="{FF2B5EF4-FFF2-40B4-BE49-F238E27FC236}">
+                <a16:creationId xmlns:a16="http://schemas.microsoft.com/office/drawing/2014/main" id="{8D99B01F-79C2-4E3B-A2B2-A065B7D9B216}"/>
+              </a:ext>
+            </a:extLst>
+          </p:cNvPr>
+          <p:cNvSpPr/>
+          <p:nvPr/>
+        </p:nvSpPr>
+        <p:spPr>
+          <a:xfrm>
+            <a:off x="5522279" y="3916681"/>
             <a:ext cx="217532" cy="45719"/>
           </a:xfrm>
           <a:custGeom>
@@ -6335,10 +6485,63 @@
       </p:sp>
       <p:sp>
         <p:nvSpPr>
-          <p:cNvPr id="96" name="TextBox 95">
+          <p:cNvPr id="102" name="Rectangle 101">
             <a:extLst>
               <a:ext uri="{FF2B5EF4-FFF2-40B4-BE49-F238E27FC236}">
-                <a16:creationId xmlns:a16="http://schemas.microsoft.com/office/drawing/2014/main" id="{E1F61F72-1C6C-4417-BC98-266E3B315FC7}"/>
+                <a16:creationId xmlns:a16="http://schemas.microsoft.com/office/drawing/2014/main" id="{CC16BFD4-E8EE-4160-9275-9C7E4DC3C6AB}"/>
+              </a:ext>
+            </a:extLst>
+          </p:cNvPr>
+          <p:cNvSpPr/>
+          <p:nvPr/>
+        </p:nvSpPr>
+        <p:spPr>
+          <a:xfrm>
+            <a:off x="5442189" y="3929499"/>
+            <a:ext cx="120050" cy="694685"/>
+          </a:xfrm>
+          <a:prstGeom prst="rect">
+            <a:avLst/>
+          </a:prstGeom>
+          <a:solidFill>
+            <a:srgbClr val="0070C0"/>
+          </a:solidFill>
+          <a:ln>
+            <a:solidFill>
+              <a:schemeClr val="tx1"/>
+            </a:solidFill>
+          </a:ln>
+          <a:effectLst/>
+        </p:spPr>
+        <p:style>
+          <a:lnRef idx="1">
+            <a:schemeClr val="accent3"/>
+          </a:lnRef>
+          <a:fillRef idx="2">
+            <a:schemeClr val="accent3"/>
+          </a:fillRef>
+          <a:effectRef idx="1">
+            <a:schemeClr val="accent3"/>
+          </a:effectRef>
+          <a:fontRef idx="minor">
+            <a:schemeClr val="dk1"/>
+          </a:fontRef>
+        </p:style>
+        <p:txBody>
+          <a:bodyPr rtlCol="0" anchor="ctr"/>
+          <a:lstStyle/>
+          <a:p>
+            <a:pPr algn="ctr"/>
+            <a:endParaRPr lang="en-SG" sz="1400"/>
+          </a:p>
+        </p:txBody>
+      </p:sp>
+      <p:sp>
+        <p:nvSpPr>
+          <p:cNvPr id="104" name="TextBox 103">
+            <a:extLst>
+              <a:ext uri="{FF2B5EF4-FFF2-40B4-BE49-F238E27FC236}">
+                <a16:creationId xmlns:a16="http://schemas.microsoft.com/office/drawing/2014/main" id="{D07844D4-1F5B-442C-94F5-D7C94A289BA0}"/>
               </a:ext>
             </a:extLst>
           </p:cNvPr>
@@ -6347,7 +6550,7 @@
         </p:nvSpPr>
         <p:spPr>
           <a:xfrm>
-            <a:off x="5721851" y="3499977"/>
+            <a:off x="5699264" y="3869323"/>
             <a:ext cx="2058089" cy="169277"/>
           </a:xfrm>
           <a:prstGeom prst="rect">
@@ -6374,21 +6577,78 @@
           <a:p>
             <a:r>
               <a:rPr lang="en-US" sz="1100" dirty="0" err="1"/>
-              <a:t>computeRangeOfWeeks</a:t>
+              <a:t>saveRangeOfWeeks</a:t>
             </a:r>
             <a:r>
               <a:rPr lang="en-US" sz="1100" dirty="0"/>
-              <a:t>(“130818”)</a:t>
-            </a:r>
-          </a:p>
-        </p:txBody>
-      </p:sp>
-      <p:sp>
-        <p:nvSpPr>
-          <p:cNvPr id="97" name="Rectangle 96">
+              <a:t>(</a:t>
+            </a:r>
+            <a:r>
+              <a:rPr lang="en-US" sz="1100" dirty="0" err="1"/>
+              <a:t>rangeOfWeek</a:t>
+            </a:r>
+            <a:r>
+              <a:rPr lang="en-US" sz="1100" dirty="0"/>
+              <a:t>)</a:t>
+            </a:r>
+          </a:p>
+        </p:txBody>
+      </p:sp>
+      <p:cxnSp>
+        <p:nvCxnSpPr>
+          <p:cNvPr id="60" name="Straight Arrow Connector 59">
             <a:extLst>
               <a:ext uri="{FF2B5EF4-FFF2-40B4-BE49-F238E27FC236}">
-                <a16:creationId xmlns:a16="http://schemas.microsoft.com/office/drawing/2014/main" id="{E6D861D5-2BA5-4625-9B4B-76E6B38EB67F}"/>
+                <a16:creationId xmlns:a16="http://schemas.microsoft.com/office/drawing/2014/main" id="{F471103F-25A8-4490-AD9C-253A07F0923C}"/>
+              </a:ext>
+            </a:extLst>
+          </p:cNvPr>
+          <p:cNvCxnSpPr>
+            <a:cxnSpLocks/>
+          </p:cNvCxnSpPr>
+          <p:nvPr/>
+        </p:nvCxnSpPr>
+        <p:spPr>
+          <a:xfrm flipV="1">
+            <a:off x="5562239" y="4555117"/>
+            <a:ext cx="2835319" cy="8640"/>
+          </a:xfrm>
+          <a:prstGeom prst="straightConnector1">
+            <a:avLst/>
+          </a:prstGeom>
+          <a:ln w="19050">
+            <a:solidFill>
+              <a:schemeClr val="accent4">
+                <a:lumMod val="60000"/>
+                <a:lumOff val="40000"/>
+              </a:schemeClr>
+            </a:solidFill>
+            <a:prstDash val="sysDash"/>
+            <a:headEnd type="arrow" w="med" len="med"/>
+            <a:tailEnd type="none" w="med" len="med"/>
+          </a:ln>
+        </p:spPr>
+        <p:style>
+          <a:lnRef idx="1">
+            <a:schemeClr val="accent1"/>
+          </a:lnRef>
+          <a:fillRef idx="0">
+            <a:schemeClr val="accent1"/>
+          </a:fillRef>
+          <a:effectRef idx="0">
+            <a:schemeClr val="accent1"/>
+          </a:effectRef>
+          <a:fontRef idx="minor">
+            <a:schemeClr val="tx1"/>
+          </a:fontRef>
+        </p:style>
+      </p:cxnSp>
+      <p:sp>
+        <p:nvSpPr>
+          <p:cNvPr id="61" name="Rectangle 62">
+            <a:extLst>
+              <a:ext uri="{FF2B5EF4-FFF2-40B4-BE49-F238E27FC236}">
+                <a16:creationId xmlns:a16="http://schemas.microsoft.com/office/drawing/2014/main" id="{7F691045-D3F8-409D-BE21-ACA2D74C063B}"/>
               </a:ext>
             </a:extLst>
           </p:cNvPr>
@@ -6397,8 +6657,118 @@
         </p:nvSpPr>
         <p:spPr>
           <a:xfrm>
-            <a:off x="5448310" y="3615422"/>
-            <a:ext cx="105975" cy="107664"/>
+            <a:off x="5739811" y="1388499"/>
+            <a:ext cx="598812" cy="432035"/>
+          </a:xfrm>
+          <a:prstGeom prst="rect">
+            <a:avLst/>
+          </a:prstGeom>
+          <a:solidFill>
+            <a:srgbClr val="0070C0"/>
+          </a:solidFill>
+          <a:ln w="19050">
+            <a:solidFill>
+              <a:srgbClr val="0070C0"/>
+            </a:solidFill>
+          </a:ln>
+          <a:effectLst/>
+        </p:spPr>
+        <p:style>
+          <a:lnRef idx="1">
+            <a:schemeClr val="accent2"/>
+          </a:lnRef>
+          <a:fillRef idx="2">
+            <a:schemeClr val="accent2"/>
+          </a:fillRef>
+          <a:effectRef idx="1">
+            <a:schemeClr val="accent2"/>
+          </a:effectRef>
+          <a:fontRef idx="minor">
+            <a:schemeClr val="dk1"/>
+          </a:fontRef>
+        </p:style>
+        <p:txBody>
+          <a:bodyPr rtlCol="0" anchor="ctr"/>
+          <a:lstStyle/>
+          <a:p>
+            <a:pPr algn="ctr"/>
+            <a:r>
+              <a:rPr lang="en-US" sz="1400" dirty="0">
+                <a:solidFill>
+                  <a:schemeClr val="bg1"/>
+                </a:solidFill>
+              </a:rPr>
+              <a:t>:Date</a:t>
+            </a:r>
+            <a:endParaRPr lang="en-SG" sz="1400" dirty="0">
+              <a:solidFill>
+                <a:schemeClr val="bg1"/>
+              </a:solidFill>
+            </a:endParaRPr>
+          </a:p>
+        </p:txBody>
+      </p:sp>
+      <p:cxnSp>
+        <p:nvCxnSpPr>
+          <p:cNvPr id="62" name="Straight Connector 61">
+            <a:extLst>
+              <a:ext uri="{FF2B5EF4-FFF2-40B4-BE49-F238E27FC236}">
+                <a16:creationId xmlns:a16="http://schemas.microsoft.com/office/drawing/2014/main" id="{2CE94709-871C-417B-A099-1D2BA49F39EB}"/>
+              </a:ext>
+            </a:extLst>
+          </p:cNvPr>
+          <p:cNvCxnSpPr>
+            <a:cxnSpLocks/>
+          </p:cNvCxnSpPr>
+          <p:nvPr/>
+        </p:nvCxnSpPr>
+        <p:spPr>
+          <a:xfrm>
+            <a:off x="6076098" y="1820534"/>
+            <a:ext cx="0" cy="518999"/>
+          </a:xfrm>
+          <a:prstGeom prst="line">
+            <a:avLst/>
+          </a:prstGeom>
+          <a:ln w="19050">
+            <a:solidFill>
+              <a:srgbClr val="0070C0"/>
+            </a:solidFill>
+            <a:prstDash val="sysDash"/>
+          </a:ln>
+          <a:effectLst/>
+        </p:spPr>
+        <p:style>
+          <a:lnRef idx="1">
+            <a:schemeClr val="accent1"/>
+          </a:lnRef>
+          <a:fillRef idx="2">
+            <a:schemeClr val="accent1"/>
+          </a:fillRef>
+          <a:effectRef idx="1">
+            <a:schemeClr val="accent1"/>
+          </a:effectRef>
+          <a:fontRef idx="minor">
+            <a:schemeClr val="dk1"/>
+          </a:fontRef>
+        </p:style>
+      </p:cxnSp>
+      <p:sp>
+        <p:nvSpPr>
+          <p:cNvPr id="66" name="Rectangle 65">
+            <a:extLst>
+              <a:ext uri="{FF2B5EF4-FFF2-40B4-BE49-F238E27FC236}">
+                <a16:creationId xmlns:a16="http://schemas.microsoft.com/office/drawing/2014/main" id="{3B3863E1-7F05-4DC4-A7DF-F22C3384C3E9}"/>
+              </a:ext>
+            </a:extLst>
+          </p:cNvPr>
+          <p:cNvSpPr/>
+          <p:nvPr/>
+        </p:nvSpPr>
+        <p:spPr>
+          <a:xfrm>
+            <a:off x="6037327" y="2137858"/>
+            <a:ext cx="98138" cy="114711"/>
           </a:xfrm>
           <a:prstGeom prst="rect">
             <a:avLst/>
@@ -6408,7 +6778,7 @@
           </a:solidFill>
           <a:ln>
             <a:solidFill>
-              <a:schemeClr val="tx1"/>
+              <a:srgbClr val="0070C0"/>
             </a:solidFill>
           </a:ln>
           <a:effectLst/>
@@ -6432,292 +6802,16 @@
           <a:lstStyle/>
           <a:p>
             <a:pPr algn="ctr"/>
-            <a:endParaRPr lang="en-SG" sz="1400"/>
-          </a:p>
-        </p:txBody>
-      </p:sp>
-      <p:sp>
-        <p:nvSpPr>
-          <p:cNvPr id="98" name="TextBox 97">
+            <a:endParaRPr lang="en-SG" sz="1100"/>
+          </a:p>
+        </p:txBody>
+      </p:sp>
+      <p:cxnSp>
+        <p:nvCxnSpPr>
+          <p:cNvPr id="67" name="Straight Arrow Connector 66">
             <a:extLst>
               <a:ext uri="{FF2B5EF4-FFF2-40B4-BE49-F238E27FC236}">
-                <a16:creationId xmlns:a16="http://schemas.microsoft.com/office/drawing/2014/main" id="{FA081E4E-6F91-4E65-A922-6996D924E23C}"/>
-              </a:ext>
-            </a:extLst>
-          </p:cNvPr>
-          <p:cNvSpPr txBox="1"/>
-          <p:nvPr/>
-        </p:nvSpPr>
-        <p:spPr>
-          <a:xfrm>
-            <a:off x="5697842" y="3650132"/>
-            <a:ext cx="807664" cy="169277"/>
-          </a:xfrm>
-          <a:prstGeom prst="rect">
-            <a:avLst/>
-          </a:prstGeom>
-          <a:noFill/>
-        </p:spPr>
-        <p:txBody>
-          <a:bodyPr wrap="square" lIns="0" tIns="0" rIns="0" bIns="0" rtlCol="0">
-            <a:spAutoFit/>
-          </a:bodyPr>
-          <a:lstStyle>
-            <a:defPPr>
-              <a:defRPr lang="en-US"/>
-            </a:defPPr>
-            <a:lvl1pPr algn="r">
-              <a:defRPr sz="1400">
-                <a:solidFill>
-                  <a:srgbClr val="0070C0"/>
-                </a:solidFill>
-              </a:defRPr>
-            </a:lvl1pPr>
-          </a:lstStyle>
-          <a:p>
-            <a:r>
-              <a:rPr lang="en-US" sz="1100" dirty="0" err="1"/>
-              <a:t>rangeOfWeek</a:t>
-            </a:r>
-            <a:endParaRPr lang="en-US" sz="1100" dirty="0"/>
-          </a:p>
-        </p:txBody>
-      </p:sp>
-      <p:sp>
-        <p:nvSpPr>
-          <p:cNvPr id="101" name="Freeform: Shape 100">
-            <a:extLst>
-              <a:ext uri="{FF2B5EF4-FFF2-40B4-BE49-F238E27FC236}">
-                <a16:creationId xmlns:a16="http://schemas.microsoft.com/office/drawing/2014/main" id="{8D99B01F-79C2-4E3B-A2B2-A065B7D9B216}"/>
-              </a:ext>
-            </a:extLst>
-          </p:cNvPr>
-          <p:cNvSpPr/>
-          <p:nvPr/>
-        </p:nvSpPr>
-        <p:spPr>
-          <a:xfrm>
-            <a:off x="5522279" y="3916681"/>
-            <a:ext cx="217532" cy="45719"/>
-          </a:xfrm>
-          <a:custGeom>
-            <a:avLst/>
-            <a:gdLst>
-              <a:gd name="connsiteX0" fmla="*/ 0 w 181569"/>
-              <a:gd name="connsiteY0" fmla="*/ 48189 h 136841"/>
-              <a:gd name="connsiteX1" fmla="*/ 76200 w 181569"/>
-              <a:gd name="connsiteY1" fmla="*/ 564 h 136841"/>
-              <a:gd name="connsiteX2" fmla="*/ 180975 w 181569"/>
-              <a:gd name="connsiteY2" fmla="*/ 76764 h 136841"/>
-              <a:gd name="connsiteX3" fmla="*/ 114300 w 181569"/>
-              <a:gd name="connsiteY3" fmla="*/ 133914 h 136841"/>
-              <a:gd name="connsiteX4" fmla="*/ 19050 w 181569"/>
-              <a:gd name="connsiteY4" fmla="*/ 133914 h 136841"/>
-            </a:gdLst>
-            <a:ahLst/>
-            <a:cxnLst>
-              <a:cxn ang="0">
-                <a:pos x="connsiteX0" y="connsiteY0"/>
-              </a:cxn>
-              <a:cxn ang="0">
-                <a:pos x="connsiteX1" y="connsiteY1"/>
-              </a:cxn>
-              <a:cxn ang="0">
-                <a:pos x="connsiteX2" y="connsiteY2"/>
-              </a:cxn>
-              <a:cxn ang="0">
-                <a:pos x="connsiteX3" y="connsiteY3"/>
-              </a:cxn>
-              <a:cxn ang="0">
-                <a:pos x="connsiteX4" y="connsiteY4"/>
-              </a:cxn>
-            </a:cxnLst>
-            <a:rect l="l" t="t" r="r" b="b"/>
-            <a:pathLst>
-              <a:path w="181569" h="136841">
-                <a:moveTo>
-                  <a:pt x="0" y="48189"/>
-                </a:moveTo>
-                <a:cubicBezTo>
-                  <a:pt x="23019" y="21995"/>
-                  <a:pt x="46038" y="-4199"/>
-                  <a:pt x="76200" y="564"/>
-                </a:cubicBezTo>
-                <a:cubicBezTo>
-                  <a:pt x="106363" y="5326"/>
-                  <a:pt x="174625" y="54539"/>
-                  <a:pt x="180975" y="76764"/>
-                </a:cubicBezTo>
-                <a:cubicBezTo>
-                  <a:pt x="187325" y="98989"/>
-                  <a:pt x="141287" y="124389"/>
-                  <a:pt x="114300" y="133914"/>
-                </a:cubicBezTo>
-                <a:cubicBezTo>
-                  <a:pt x="87313" y="143439"/>
-                  <a:pt x="28575" y="125977"/>
-                  <a:pt x="19050" y="133914"/>
-                </a:cubicBezTo>
-              </a:path>
-            </a:pathLst>
-          </a:custGeom>
-          <a:ln>
-            <a:solidFill>
-              <a:srgbClr val="0070C0"/>
-            </a:solidFill>
-            <a:prstDash val="solid"/>
-            <a:tailEnd type="triangle"/>
-          </a:ln>
-        </p:spPr>
-        <p:style>
-          <a:lnRef idx="1">
-            <a:schemeClr val="accent1"/>
-          </a:lnRef>
-          <a:fillRef idx="0">
-            <a:schemeClr val="accent1"/>
-          </a:fillRef>
-          <a:effectRef idx="0">
-            <a:schemeClr val="accent1"/>
-          </a:effectRef>
-          <a:fontRef idx="minor">
-            <a:schemeClr val="tx1"/>
-          </a:fontRef>
-        </p:style>
-        <p:txBody>
-          <a:bodyPr rot="0" spcFirstLastPara="0" vertOverflow="overflow" horzOverflow="overflow" vert="horz" wrap="square" lIns="91440" tIns="45720" rIns="91440" bIns="45720" numCol="1" spcCol="0" rtlCol="0" fromWordArt="0" anchor="ctr" anchorCtr="0" forceAA="0" compatLnSpc="1">
-            <a:prstTxWarp prst="textNoShape">
-              <a:avLst/>
-            </a:prstTxWarp>
-            <a:noAutofit/>
-          </a:bodyPr>
-          <a:lstStyle/>
-          <a:p>
-            <a:pPr algn="ctr"/>
-            <a:endParaRPr lang="en-SG">
-              <a:solidFill>
-                <a:schemeClr val="tx1"/>
-              </a:solidFill>
-            </a:endParaRPr>
-          </a:p>
-        </p:txBody>
-      </p:sp>
-      <p:sp>
-        <p:nvSpPr>
-          <p:cNvPr id="102" name="Rectangle 101">
-            <a:extLst>
-              <a:ext uri="{FF2B5EF4-FFF2-40B4-BE49-F238E27FC236}">
-                <a16:creationId xmlns:a16="http://schemas.microsoft.com/office/drawing/2014/main" id="{CC16BFD4-E8EE-4160-9275-9C7E4DC3C6AB}"/>
-              </a:ext>
-            </a:extLst>
-          </p:cNvPr>
-          <p:cNvSpPr/>
-          <p:nvPr/>
-        </p:nvSpPr>
-        <p:spPr>
-          <a:xfrm>
-            <a:off x="5442189" y="3929499"/>
-            <a:ext cx="120050" cy="694685"/>
-          </a:xfrm>
-          <a:prstGeom prst="rect">
-            <a:avLst/>
-          </a:prstGeom>
-          <a:solidFill>
-            <a:srgbClr val="0070C0"/>
-          </a:solidFill>
-          <a:ln>
-            <a:solidFill>
-              <a:schemeClr val="tx1"/>
-            </a:solidFill>
-          </a:ln>
-          <a:effectLst/>
-        </p:spPr>
-        <p:style>
-          <a:lnRef idx="1">
-            <a:schemeClr val="accent3"/>
-          </a:lnRef>
-          <a:fillRef idx="2">
-            <a:schemeClr val="accent3"/>
-          </a:fillRef>
-          <a:effectRef idx="1">
-            <a:schemeClr val="accent3"/>
-          </a:effectRef>
-          <a:fontRef idx="minor">
-            <a:schemeClr val="dk1"/>
-          </a:fontRef>
-        </p:style>
-        <p:txBody>
-          <a:bodyPr rtlCol="0" anchor="ctr"/>
-          <a:lstStyle/>
-          <a:p>
-            <a:pPr algn="ctr"/>
-            <a:endParaRPr lang="en-SG" sz="1400"/>
-          </a:p>
-        </p:txBody>
-      </p:sp>
-      <p:sp>
-        <p:nvSpPr>
-          <p:cNvPr id="104" name="TextBox 103">
-            <a:extLst>
-              <a:ext uri="{FF2B5EF4-FFF2-40B4-BE49-F238E27FC236}">
-                <a16:creationId xmlns:a16="http://schemas.microsoft.com/office/drawing/2014/main" id="{D07844D4-1F5B-442C-94F5-D7C94A289BA0}"/>
-              </a:ext>
-            </a:extLst>
-          </p:cNvPr>
-          <p:cNvSpPr txBox="1"/>
-          <p:nvPr/>
-        </p:nvSpPr>
-        <p:spPr>
-          <a:xfrm>
-            <a:off x="5699264" y="3869323"/>
-            <a:ext cx="2058089" cy="169277"/>
-          </a:xfrm>
-          <a:prstGeom prst="rect">
-            <a:avLst/>
-          </a:prstGeom>
-          <a:noFill/>
-        </p:spPr>
-        <p:txBody>
-          <a:bodyPr wrap="square" lIns="0" tIns="0" rIns="0" bIns="0" rtlCol="0">
-            <a:spAutoFit/>
-          </a:bodyPr>
-          <a:lstStyle>
-            <a:defPPr>
-              <a:defRPr lang="en-US"/>
-            </a:defPPr>
-            <a:lvl1pPr algn="r">
-              <a:defRPr sz="1400">
-                <a:solidFill>
-                  <a:srgbClr val="0070C0"/>
-                </a:solidFill>
-              </a:defRPr>
-            </a:lvl1pPr>
-          </a:lstStyle>
-          <a:p>
-            <a:r>
-              <a:rPr lang="en-US" sz="1100" dirty="0" err="1"/>
-              <a:t>saveRangeOfWeeks</a:t>
-            </a:r>
-            <a:r>
-              <a:rPr lang="en-US" sz="1100" dirty="0"/>
-              <a:t>(</a:t>
-            </a:r>
-            <a:r>
-              <a:rPr lang="en-US" sz="1100" dirty="0" err="1"/>
-              <a:t>rangeOfWeek</a:t>
-            </a:r>
-            <a:r>
-              <a:rPr lang="en-US" sz="1100" dirty="0"/>
-              <a:t>)</a:t>
-            </a:r>
-          </a:p>
-        </p:txBody>
-      </p:sp>
-      <p:cxnSp>
-        <p:nvCxnSpPr>
-          <p:cNvPr id="60" name="Straight Arrow Connector 59">
-            <a:extLst>
-              <a:ext uri="{FF2B5EF4-FFF2-40B4-BE49-F238E27FC236}">
-                <a16:creationId xmlns:a16="http://schemas.microsoft.com/office/drawing/2014/main" id="{F471103F-25A8-4490-AD9C-253A07F0923C}"/>
+                <a16:creationId xmlns:a16="http://schemas.microsoft.com/office/drawing/2014/main" id="{4758ED5C-D730-44AB-ADB8-CCBB9497A586}"/>
               </a:ext>
             </a:extLst>
           </p:cNvPr>
@@ -6728,18 +6822,59 @@
         </p:nvCxnSpPr>
         <p:spPr>
           <a:xfrm flipV="1">
-            <a:off x="5562239" y="4555117"/>
-            <a:ext cx="2835319" cy="8640"/>
+            <a:off x="3832903" y="2155635"/>
+            <a:ext cx="2204423" cy="24018"/>
           </a:xfrm>
           <a:prstGeom prst="straightConnector1">
             <a:avLst/>
           </a:prstGeom>
           <a:ln w="19050">
             <a:solidFill>
-              <a:schemeClr val="accent4">
-                <a:lumMod val="60000"/>
-                <a:lumOff val="40000"/>
-              </a:schemeClr>
+              <a:srgbClr val="0070C0"/>
+            </a:solidFill>
+            <a:tailEnd type="arrow"/>
+          </a:ln>
+        </p:spPr>
+        <p:style>
+          <a:lnRef idx="1">
+            <a:schemeClr val="accent1"/>
+          </a:lnRef>
+          <a:fillRef idx="0">
+            <a:schemeClr val="accent1"/>
+          </a:fillRef>
+          <a:effectRef idx="0">
+            <a:schemeClr val="accent1"/>
+          </a:effectRef>
+          <a:fontRef idx="minor">
+            <a:schemeClr val="tx1"/>
+          </a:fontRef>
+        </p:style>
+      </p:cxnSp>
+      <p:cxnSp>
+        <p:nvCxnSpPr>
+          <p:cNvPr id="68" name="Straight Arrow Connector 67">
+            <a:extLst>
+              <a:ext uri="{FF2B5EF4-FFF2-40B4-BE49-F238E27FC236}">
+                <a16:creationId xmlns:a16="http://schemas.microsoft.com/office/drawing/2014/main" id="{98EAD422-3556-42C0-AE44-600F05364137}"/>
+              </a:ext>
+            </a:extLst>
+          </p:cNvPr>
+          <p:cNvCxnSpPr>
+            <a:cxnSpLocks/>
+          </p:cNvCxnSpPr>
+          <p:nvPr/>
+        </p:nvCxnSpPr>
+        <p:spPr>
+          <a:xfrm flipV="1">
+            <a:off x="3885250" y="2237331"/>
+            <a:ext cx="2152077" cy="21727"/>
+          </a:xfrm>
+          <a:prstGeom prst="straightConnector1">
+            <a:avLst/>
+          </a:prstGeom>
+          <a:ln w="19050">
+            <a:solidFill>
+              <a:srgbClr val="0070C0"/>
             </a:solidFill>
             <a:prstDash val="sysDash"/>
             <a:headEnd type="arrow" w="med" len="med"/>

</xml_diff>

<commit_message>
fix: FirstDay sequence diagram
</commit_message>
<xml_diff>
--- a/docs/diagrams/FirstDaySequenceDiagram.pptx
+++ b/docs/diagrams/FirstDaySequenceDiagram.pptx
@@ -3855,7 +3855,7 @@
         <p:spPr>
           <a:xfrm>
             <a:off x="1906145" y="1587550"/>
-            <a:ext cx="204581" cy="1768913"/>
+            <a:ext cx="204581" cy="1796399"/>
           </a:xfrm>
           <a:prstGeom prst="rect">
             <a:avLst/>
@@ -3905,7 +3905,7 @@
         </p:nvSpPr>
         <p:spPr>
           <a:xfrm>
-            <a:off x="4843120" y="2661540"/>
+            <a:off x="4807743" y="2707541"/>
             <a:ext cx="1093635" cy="461538"/>
           </a:xfrm>
           <a:prstGeom prst="rect">
@@ -3982,8 +3982,8 @@
         </p:nvCxnSpPr>
         <p:spPr>
           <a:xfrm flipH="1">
-            <a:off x="5394130" y="3123079"/>
-            <a:ext cx="3768" cy="2548548"/>
+            <a:off x="5394130" y="3182660"/>
+            <a:ext cx="8128" cy="2488967"/>
           </a:xfrm>
           <a:prstGeom prst="line">
             <a:avLst/>
@@ -4019,8 +4019,8 @@
         </p:nvSpPr>
         <p:spPr>
           <a:xfrm>
-            <a:off x="5325467" y="3123079"/>
-            <a:ext cx="144861" cy="170834"/>
+            <a:off x="5325467" y="3182660"/>
+            <a:ext cx="153582" cy="73966"/>
           </a:xfrm>
           <a:prstGeom prst="rect">
             <a:avLst/>
@@ -4194,7 +4194,7 @@
         </p:nvCxnSpPr>
         <p:spPr>
           <a:xfrm flipV="1">
-            <a:off x="3887784" y="2777814"/>
+            <a:off x="3897444" y="2941654"/>
             <a:ext cx="922392" cy="1"/>
           </a:xfrm>
           <a:prstGeom prst="straightConnector1">
@@ -4272,7 +4272,7 @@
         </p:nvCxnSpPr>
         <p:spPr>
           <a:xfrm>
-            <a:off x="3885250" y="3276600"/>
+            <a:off x="3874491" y="3245583"/>
             <a:ext cx="1492974" cy="0"/>
           </a:xfrm>
           <a:prstGeom prst="straightConnector1">
@@ -4312,7 +4312,7 @@
         </p:nvCxnSpPr>
         <p:spPr>
           <a:xfrm flipV="1">
-            <a:off x="300850" y="3341875"/>
+            <a:off x="300866" y="3376586"/>
             <a:ext cx="1596514" cy="5378"/>
           </a:xfrm>
           <a:prstGeom prst="straightConnector1">
@@ -4687,7 +4687,7 @@
         </p:nvCxnSpPr>
         <p:spPr>
           <a:xfrm>
-            <a:off x="291268" y="5477934"/>
+            <a:off x="304800" y="5507160"/>
             <a:ext cx="5052349" cy="0"/>
           </a:xfrm>
           <a:prstGeom prst="straightConnector1">
@@ -4809,7 +4809,7 @@
         </p:nvSpPr>
         <p:spPr>
           <a:xfrm>
-            <a:off x="2540419" y="2742404"/>
+            <a:off x="2433517" y="2097699"/>
             <a:ext cx="1042552" cy="169277"/>
           </a:xfrm>
           <a:prstGeom prst="rect">
@@ -4897,7 +4897,7 @@
         </p:nvSpPr>
         <p:spPr>
           <a:xfrm>
-            <a:off x="3344612" y="5266374"/>
+            <a:off x="3319668" y="5296773"/>
             <a:ext cx="621216" cy="169277"/>
           </a:xfrm>
           <a:prstGeom prst="rect">
@@ -5256,7 +5256,7 @@
         </p:nvCxnSpPr>
         <p:spPr>
           <a:xfrm>
-            <a:off x="2099643" y="2714527"/>
+            <a:off x="2090783" y="2088154"/>
             <a:ext cx="1597356" cy="1"/>
           </a:xfrm>
           <a:prstGeom prst="straightConnector1">
@@ -5291,7 +5291,7 @@
         <p:spPr>
           <a:xfrm>
             <a:off x="3681503" y="1835918"/>
-            <a:ext cx="192988" cy="637026"/>
+            <a:ext cx="192988" cy="66624"/>
           </a:xfrm>
           <a:prstGeom prst="rect">
             <a:avLst/>
@@ -5376,8 +5376,8 @@
         </p:nvSpPr>
         <p:spPr>
           <a:xfrm>
-            <a:off x="3681502" y="2700011"/>
-            <a:ext cx="205843" cy="624114"/>
+            <a:off x="3681502" y="2079279"/>
+            <a:ext cx="205843" cy="1244846"/>
           </a:xfrm>
           <a:prstGeom prst="rect">
             <a:avLst/>
@@ -5424,9 +5424,9 @@
           <p:nvPr/>
         </p:nvCxnSpPr>
         <p:spPr>
-          <a:xfrm>
-            <a:off x="2099643" y="3264633"/>
-            <a:ext cx="1667219" cy="0"/>
+          <a:xfrm flipV="1">
+            <a:off x="2117145" y="3313382"/>
+            <a:ext cx="1693639" cy="3274"/>
           </a:xfrm>
           <a:prstGeom prst="straightConnector1">
             <a:avLst/>
@@ -5539,7 +5539,7 @@
         </p:nvCxnSpPr>
         <p:spPr>
           <a:xfrm>
-            <a:off x="2110726" y="2438400"/>
+            <a:off x="2099643" y="1893666"/>
             <a:ext cx="1600428" cy="0"/>
           </a:xfrm>
           <a:prstGeom prst="straightConnector1">
@@ -5616,7 +5616,7 @@
         </p:nvSpPr>
         <p:spPr>
           <a:xfrm>
-            <a:off x="3874491" y="1893666"/>
+            <a:off x="3855121" y="2129246"/>
             <a:ext cx="217532" cy="45719"/>
           </a:xfrm>
           <a:custGeom>
@@ -5843,7 +5843,7 @@
         </p:nvSpPr>
         <p:spPr>
           <a:xfrm>
-            <a:off x="4092023" y="1830228"/>
+            <a:off x="4059267" y="2058645"/>
             <a:ext cx="1880841" cy="169277"/>
           </a:xfrm>
           <a:prstGeom prst="rect">
@@ -5893,7 +5893,7 @@
         </p:nvSpPr>
         <p:spPr>
           <a:xfrm>
-            <a:off x="3799526" y="2014600"/>
+            <a:off x="3791511" y="2217622"/>
             <a:ext cx="1583410" cy="169277"/>
           </a:xfrm>
           <a:prstGeom prst="rect">
@@ -5943,7 +5943,7 @@
         </p:nvSpPr>
         <p:spPr>
           <a:xfrm>
-            <a:off x="4034507" y="2280535"/>
+            <a:off x="4026492" y="2483557"/>
             <a:ext cx="1262666" cy="169277"/>
           </a:xfrm>
           <a:prstGeom prst="rect">
@@ -5993,7 +5993,7 @@
         </p:nvSpPr>
         <p:spPr>
           <a:xfrm>
-            <a:off x="3855027" y="2343347"/>
+            <a:off x="3847012" y="2546369"/>
             <a:ext cx="217532" cy="45719"/>
           </a:xfrm>
           <a:custGeom>
@@ -6657,7 +6657,7 @@
         </p:nvSpPr>
         <p:spPr>
           <a:xfrm>
-            <a:off x="5739811" y="1388499"/>
+            <a:off x="5731796" y="1591521"/>
             <a:ext cx="598812" cy="432035"/>
           </a:xfrm>
           <a:prstGeom prst="rect">
@@ -6724,7 +6724,7 @@
         </p:nvCxnSpPr>
         <p:spPr>
           <a:xfrm>
-            <a:off x="6076098" y="1820534"/>
+            <a:off x="6068083" y="2023556"/>
             <a:ext cx="0" cy="518999"/>
           </a:xfrm>
           <a:prstGeom prst="line">
@@ -6767,7 +6767,7 @@
         </p:nvSpPr>
         <p:spPr>
           <a:xfrm>
-            <a:off x="6037327" y="2137858"/>
+            <a:off x="6029312" y="2340880"/>
             <a:ext cx="98138" cy="114711"/>
           </a:xfrm>
           <a:prstGeom prst="rect">
@@ -6822,7 +6822,7 @@
         </p:nvCxnSpPr>
         <p:spPr>
           <a:xfrm flipV="1">
-            <a:off x="3832903" y="2155635"/>
+            <a:off x="3824888" y="2358657"/>
             <a:ext cx="2204423" cy="24018"/>
           </a:xfrm>
           <a:prstGeom prst="straightConnector1">
@@ -6866,7 +6866,7 @@
         </p:nvCxnSpPr>
         <p:spPr>
           <a:xfrm flipV="1">
-            <a:off x="3885250" y="2237331"/>
+            <a:off x="3877235" y="2440353"/>
             <a:ext cx="2152077" cy="21727"/>
           </a:xfrm>
           <a:prstGeom prst="straightConnector1">

</xml_diff>